<commit_message>
add aliasing bug example
</commit_message>
<xml_diff>
--- a/Presentation.pptx
+++ b/Presentation.pptx
@@ -213,7 +213,7 @@
           <a:p>
             <a:fld id="{EE1B07CF-4139-4C52-9895-1EE0A749592B}" type="datetimeFigureOut">
               <a:rPr lang="en-US" smtClean="0"/>
-              <a:t>11/30/2016</a:t>
+              <a:t>9/7/2017</a:t>
             </a:fld>
             <a:endParaRPr lang="en-US"/>
           </a:p>
@@ -378,7 +378,7 @@
           <a:p>
             <a:fld id="{9C6F807B-2A0F-480E-9E04-B0484CB2FEB9}" type="datetimeFigureOut">
               <a:rPr lang="en-US" smtClean="0"/>
-              <a:t>11/30/2016</a:t>
+              <a:t>9/7/2017</a:t>
             </a:fld>
             <a:endParaRPr lang="en-US"/>
           </a:p>
@@ -2575,7 +2575,18 @@
           <a:bodyPr/>
           <a:lstStyle/>
           <a:p>
-            <a:endParaRPr lang="en-US"/>
+            <a:r>
+              <a:rPr lang="pl-PL" sz="1200" kern="1200" dirty="0" err="1">
+                <a:solidFill>
+                  <a:schemeClr val="tx1"/>
+                </a:solidFill>
+                <a:latin typeface="+mn-lt"/>
+                <a:ea typeface="+mn-ea"/>
+                <a:cs typeface="+mn-cs"/>
+              </a:rPr>
+              <a:t>Demo.Logic.Tests.AliasingBugTests</a:t>
+            </a:r>
+            <a:endParaRPr lang="en-US" dirty="0"/>
           </a:p>
         </p:txBody>
       </p:sp>
@@ -2918,7 +2929,7 @@
           <a:p>
             <a:fld id="{4AAD347D-5ACD-4C99-B74B-A9C85AD731AF}" type="datetimeFigureOut">
               <a:rPr lang="en-US" dirty="0"/>
-              <a:t>11/30/2016</a:t>
+              <a:t>9/7/2017</a:t>
             </a:fld>
             <a:endParaRPr lang="en-US" dirty="0"/>
           </a:p>
@@ -3188,7 +3199,7 @@
           <a:p>
             <a:fld id="{4509A250-FF31-4206-8172-F9D3106AACB1}" type="datetimeFigureOut">
               <a:rPr lang="en-US" dirty="0"/>
-              <a:t>11/30/2016</a:t>
+              <a:t>9/7/2017</a:t>
             </a:fld>
             <a:endParaRPr lang="en-US" dirty="0"/>
           </a:p>
@@ -3377,7 +3388,7 @@
           <a:p>
             <a:fld id="{4509A250-FF31-4206-8172-F9D3106AACB1}" type="datetimeFigureOut">
               <a:rPr lang="en-US" dirty="0"/>
-              <a:t>11/30/2016</a:t>
+              <a:t>9/7/2017</a:t>
             </a:fld>
             <a:endParaRPr lang="en-US" dirty="0"/>
           </a:p>
@@ -3645,7 +3656,7 @@
           <a:p>
             <a:fld id="{4509A250-FF31-4206-8172-F9D3106AACB1}" type="datetimeFigureOut">
               <a:rPr lang="en-US" dirty="0"/>
-              <a:t>11/30/2016</a:t>
+              <a:t>9/7/2017</a:t>
             </a:fld>
             <a:endParaRPr lang="en-US" dirty="0"/>
           </a:p>
@@ -3981,7 +3992,7 @@
           <a:p>
             <a:fld id="{4509A250-FF31-4206-8172-F9D3106AACB1}" type="datetimeFigureOut">
               <a:rPr lang="en-US" dirty="0"/>
-              <a:t>11/30/2016</a:t>
+              <a:t>9/7/2017</a:t>
             </a:fld>
             <a:endParaRPr lang="en-US" dirty="0"/>
           </a:p>
@@ -4599,7 +4610,7 @@
           <a:p>
             <a:fld id="{4509A250-FF31-4206-8172-F9D3106AACB1}" type="datetimeFigureOut">
               <a:rPr lang="en-US" dirty="0"/>
-              <a:t>11/30/2016</a:t>
+              <a:t>9/7/2017</a:t>
             </a:fld>
             <a:endParaRPr lang="en-US" dirty="0"/>
           </a:p>
@@ -5454,7 +5465,7 @@
           <a:p>
             <a:fld id="{4509A250-FF31-4206-8172-F9D3106AACB1}" type="datetimeFigureOut">
               <a:rPr lang="en-US" dirty="0"/>
-              <a:t>11/30/2016</a:t>
+              <a:t>9/7/2017</a:t>
             </a:fld>
             <a:endParaRPr lang="en-US" dirty="0"/>
           </a:p>
@@ -5619,7 +5630,7 @@
           <a:p>
             <a:fld id="{4509A250-FF31-4206-8172-F9D3106AACB1}" type="datetimeFigureOut">
               <a:rPr lang="en-US" dirty="0"/>
-              <a:t>11/30/2016</a:t>
+              <a:t>9/7/2017</a:t>
             </a:fld>
             <a:endParaRPr lang="en-US" dirty="0"/>
           </a:p>
@@ -5794,7 +5805,7 @@
           <a:p>
             <a:fld id="{4509A250-FF31-4206-8172-F9D3106AACB1}" type="datetimeFigureOut">
               <a:rPr lang="en-US" dirty="0"/>
-              <a:t>11/30/2016</a:t>
+              <a:t>9/7/2017</a:t>
             </a:fld>
             <a:endParaRPr lang="en-US" dirty="0"/>
           </a:p>
@@ -5959,7 +5970,7 @@
           <a:p>
             <a:fld id="{4509A250-FF31-4206-8172-F9D3106AACB1}" type="datetimeFigureOut">
               <a:rPr lang="en-US" dirty="0"/>
-              <a:t>11/30/2016</a:t>
+              <a:t>9/7/2017</a:t>
             </a:fld>
             <a:endParaRPr lang="en-US" dirty="0"/>
           </a:p>
@@ -6201,7 +6212,7 @@
           <a:p>
             <a:fld id="{9796027F-7875-4030-9381-8BD8C4F21935}" type="datetimeFigureOut">
               <a:rPr lang="en-US" dirty="0"/>
-              <a:t>11/30/2016</a:t>
+              <a:t>9/7/2017</a:t>
             </a:fld>
             <a:endParaRPr lang="en-US" dirty="0"/>
           </a:p>
@@ -6488,7 +6499,7 @@
           <a:p>
             <a:fld id="{9796027F-7875-4030-9381-8BD8C4F21935}" type="datetimeFigureOut">
               <a:rPr lang="en-US" dirty="0"/>
-              <a:t>11/30/2016</a:t>
+              <a:t>9/7/2017</a:t>
             </a:fld>
             <a:endParaRPr lang="en-US" dirty="0"/>
           </a:p>
@@ -6927,7 +6938,7 @@
           <a:p>
             <a:fld id="{9796027F-7875-4030-9381-8BD8C4F21935}" type="datetimeFigureOut">
               <a:rPr lang="en-US" dirty="0"/>
-              <a:t>11/30/2016</a:t>
+              <a:t>9/7/2017</a:t>
             </a:fld>
             <a:endParaRPr lang="en-US" dirty="0"/>
           </a:p>
@@ -7040,7 +7051,7 @@
           <a:p>
             <a:fld id="{4509A250-FF31-4206-8172-F9D3106AACB1}" type="datetimeFigureOut">
               <a:rPr lang="en-US" dirty="0"/>
-              <a:t>11/30/2016</a:t>
+              <a:t>9/7/2017</a:t>
             </a:fld>
             <a:endParaRPr lang="en-US" dirty="0"/>
           </a:p>
@@ -7130,7 +7141,7 @@
           <a:p>
             <a:fld id="{4509A250-FF31-4206-8172-F9D3106AACB1}" type="datetimeFigureOut">
               <a:rPr lang="en-US" dirty="0"/>
-              <a:t>11/30/2016</a:t>
+              <a:t>9/7/2017</a:t>
             </a:fld>
             <a:endParaRPr lang="en-US" dirty="0"/>
           </a:p>
@@ -7404,7 +7415,7 @@
           <a:p>
             <a:fld id="{4509A250-FF31-4206-8172-F9D3106AACB1}" type="datetimeFigureOut">
               <a:rPr lang="en-US" dirty="0"/>
-              <a:t>11/30/2016</a:t>
+              <a:t>9/7/2017</a:t>
             </a:fld>
             <a:endParaRPr lang="en-US" dirty="0"/>
           </a:p>
@@ -7674,7 +7685,7 @@
           <a:p>
             <a:fld id="{4509A250-FF31-4206-8172-F9D3106AACB1}" type="datetimeFigureOut">
               <a:rPr lang="en-US" dirty="0"/>
-              <a:t>11/30/2016</a:t>
+              <a:t>9/7/2017</a:t>
             </a:fld>
             <a:endParaRPr lang="en-US" dirty="0"/>
           </a:p>
@@ -8098,7 +8109,7 @@
           <a:p>
             <a:fld id="{4AAD347D-5ACD-4C99-B74B-A9C85AD731AF}" type="datetimeFigureOut">
               <a:rPr lang="en-US" dirty="0"/>
-              <a:t>11/30/2016</a:t>
+              <a:t>9/7/2017</a:t>
             </a:fld>
             <a:endParaRPr lang="en-US" dirty="0"/>
           </a:p>
@@ -10507,6 +10518,42 @@
               <a:rPr lang="en-US" dirty="0"/>
               <a:t>With immutable classes, it is needed to validate their invariants only once, in the constructor. Once an instance of an immutable class is created, we can be absolutely sure it resides in a valid state.</a:t>
             </a:r>
+            <a:endParaRPr lang="pl-PL" dirty="0"/>
+          </a:p>
+          <a:p>
+            <a:r>
+              <a:rPr lang="pl-PL" dirty="0" err="1"/>
+              <a:t>Immutablity</a:t>
+            </a:r>
+            <a:r>
+              <a:rPr lang="pl-PL" dirty="0"/>
+              <a:t> </a:t>
+            </a:r>
+            <a:r>
+              <a:rPr lang="pl-PL" dirty="0" err="1"/>
+              <a:t>protects</a:t>
+            </a:r>
+            <a:r>
+              <a:rPr lang="pl-PL" dirty="0"/>
+              <a:t> </a:t>
+            </a:r>
+            <a:r>
+              <a:rPr lang="pl-PL" dirty="0" err="1"/>
+              <a:t>against</a:t>
+            </a:r>
+            <a:r>
+              <a:rPr lang="pl-PL" dirty="0"/>
+              <a:t> </a:t>
+            </a:r>
+            <a:r>
+              <a:rPr lang="pl-PL" dirty="0" err="1"/>
+              <a:t>Aliasing</a:t>
+            </a:r>
+            <a:r>
+              <a:rPr lang="pl-PL" dirty="0"/>
+              <a:t> Bug</a:t>
+            </a:r>
+            <a:endParaRPr lang="en-US" dirty="0"/>
           </a:p>
           <a:p>
             <a:r>

</xml_diff>